<commit_message>
Final touches Signed-off-by: Moustafa Ghareeb <moustafa.ghareeb.hpg@gmail.com>
</commit_message>
<xml_diff>
--- a/ECU1/Layered Architecture.pptx
+++ b/ECU1/Layered Architecture.pptx
@@ -241,7 +241,7 @@
           <a:p>
             <a:fld id="{FBAD6444-CDEB-4A53-A199-15DDBCDF3A15}" type="datetimeFigureOut">
               <a:rPr lang="en-US" smtClean="0"/>
-              <a:t>4/19/2020</a:t>
+              <a:t>2020-04-19</a:t>
             </a:fld>
             <a:endParaRPr lang="en-US"/>
           </a:p>
@@ -409,7 +409,7 @@
           <a:p>
             <a:fld id="{FBAD6444-CDEB-4A53-A199-15DDBCDF3A15}" type="datetimeFigureOut">
               <a:rPr lang="en-US" smtClean="0"/>
-              <a:t>4/19/2020</a:t>
+              <a:t>2020-04-19</a:t>
             </a:fld>
             <a:endParaRPr lang="en-US"/>
           </a:p>
@@ -587,7 +587,7 @@
           <a:p>
             <a:fld id="{FBAD6444-CDEB-4A53-A199-15DDBCDF3A15}" type="datetimeFigureOut">
               <a:rPr lang="en-US" smtClean="0"/>
-              <a:t>4/19/2020</a:t>
+              <a:t>2020-04-19</a:t>
             </a:fld>
             <a:endParaRPr lang="en-US"/>
           </a:p>
@@ -755,7 +755,7 @@
           <a:p>
             <a:fld id="{FBAD6444-CDEB-4A53-A199-15DDBCDF3A15}" type="datetimeFigureOut">
               <a:rPr lang="en-US" smtClean="0"/>
-              <a:t>4/19/2020</a:t>
+              <a:t>2020-04-19</a:t>
             </a:fld>
             <a:endParaRPr lang="en-US"/>
           </a:p>
@@ -1000,7 +1000,7 @@
           <a:p>
             <a:fld id="{FBAD6444-CDEB-4A53-A199-15DDBCDF3A15}" type="datetimeFigureOut">
               <a:rPr lang="en-US" smtClean="0"/>
-              <a:t>4/19/2020</a:t>
+              <a:t>2020-04-19</a:t>
             </a:fld>
             <a:endParaRPr lang="en-US"/>
           </a:p>
@@ -1229,7 +1229,7 @@
           <a:p>
             <a:fld id="{FBAD6444-CDEB-4A53-A199-15DDBCDF3A15}" type="datetimeFigureOut">
               <a:rPr lang="en-US" smtClean="0"/>
-              <a:t>4/19/2020</a:t>
+              <a:t>2020-04-19</a:t>
             </a:fld>
             <a:endParaRPr lang="en-US"/>
           </a:p>
@@ -1593,7 +1593,7 @@
           <a:p>
             <a:fld id="{FBAD6444-CDEB-4A53-A199-15DDBCDF3A15}" type="datetimeFigureOut">
               <a:rPr lang="en-US" smtClean="0"/>
-              <a:t>4/19/2020</a:t>
+              <a:t>2020-04-19</a:t>
             </a:fld>
             <a:endParaRPr lang="en-US"/>
           </a:p>
@@ -1710,7 +1710,7 @@
           <a:p>
             <a:fld id="{FBAD6444-CDEB-4A53-A199-15DDBCDF3A15}" type="datetimeFigureOut">
               <a:rPr lang="en-US" smtClean="0"/>
-              <a:t>4/19/2020</a:t>
+              <a:t>2020-04-19</a:t>
             </a:fld>
             <a:endParaRPr lang="en-US"/>
           </a:p>
@@ -1805,7 +1805,7 @@
           <a:p>
             <a:fld id="{FBAD6444-CDEB-4A53-A199-15DDBCDF3A15}" type="datetimeFigureOut">
               <a:rPr lang="en-US" smtClean="0"/>
-              <a:t>4/19/2020</a:t>
+              <a:t>2020-04-19</a:t>
             </a:fld>
             <a:endParaRPr lang="en-US"/>
           </a:p>
@@ -2080,7 +2080,7 @@
           <a:p>
             <a:fld id="{FBAD6444-CDEB-4A53-A199-15DDBCDF3A15}" type="datetimeFigureOut">
               <a:rPr lang="en-US" smtClean="0"/>
-              <a:t>4/19/2020</a:t>
+              <a:t>2020-04-19</a:t>
             </a:fld>
             <a:endParaRPr lang="en-US"/>
           </a:p>
@@ -2332,7 +2332,7 @@
           <a:p>
             <a:fld id="{FBAD6444-CDEB-4A53-A199-15DDBCDF3A15}" type="datetimeFigureOut">
               <a:rPr lang="en-US" smtClean="0"/>
-              <a:t>4/19/2020</a:t>
+              <a:t>2020-04-19</a:t>
             </a:fld>
             <a:endParaRPr lang="en-US"/>
           </a:p>
@@ -2543,7 +2543,7 @@
           <a:p>
             <a:fld id="{FBAD6444-CDEB-4A53-A199-15DDBCDF3A15}" type="datetimeFigureOut">
               <a:rPr lang="en-US" smtClean="0"/>
-              <a:t>4/19/2020</a:t>
+              <a:t>2020-04-19</a:t>
             </a:fld>
             <a:endParaRPr lang="en-US"/>
           </a:p>
@@ -2948,6 +2948,306 @@
           <a:chExt cx="0" cy="0"/>
         </a:xfrm>
       </p:grpSpPr>
+      <p:sp>
+        <p:nvSpPr>
+          <p:cNvPr id="88" name="Rectangle 87">
+            <a:extLst>
+              <a:ext uri="{FF2B5EF4-FFF2-40B4-BE49-F238E27FC236}">
+                <a16:creationId xmlns:a16="http://schemas.microsoft.com/office/drawing/2014/main" id="{6572BA62-1602-43D0-BAFB-FB8D3C928E50}"/>
+              </a:ext>
+            </a:extLst>
+          </p:cNvPr>
+          <p:cNvSpPr/>
+          <p:nvPr/>
+        </p:nvSpPr>
+        <p:spPr>
+          <a:xfrm>
+            <a:off x="1216241" y="502928"/>
+            <a:ext cx="9676660" cy="1828800"/>
+          </a:xfrm>
+          <a:prstGeom prst="rect">
+            <a:avLst/>
+          </a:prstGeom>
+          <a:solidFill>
+            <a:schemeClr val="accent1">
+              <a:alpha val="50000"/>
+            </a:schemeClr>
+          </a:solidFill>
+          <a:ln>
+            <a:noFill/>
+          </a:ln>
+        </p:spPr>
+        <p:style>
+          <a:lnRef idx="0">
+            <a:scrgbClr r="0" g="0" b="0"/>
+          </a:lnRef>
+          <a:fillRef idx="0">
+            <a:scrgbClr r="0" g="0" b="0"/>
+          </a:fillRef>
+          <a:effectRef idx="0">
+            <a:scrgbClr r="0" g="0" b="0"/>
+          </a:effectRef>
+          <a:fontRef idx="minor">
+            <a:schemeClr val="lt1"/>
+          </a:fontRef>
+        </p:style>
+        <p:txBody>
+          <a:bodyPr rtlCol="0" anchor="ctr"/>
+          <a:lstStyle/>
+          <a:p>
+            <a:pPr algn="ctr"/>
+            <a:endParaRPr lang="en-US" dirty="0"/>
+          </a:p>
+        </p:txBody>
+      </p:sp>
+      <p:sp>
+        <p:nvSpPr>
+          <p:cNvPr id="8" name="Rectangle 7">
+            <a:extLst>
+              <a:ext uri="{FF2B5EF4-FFF2-40B4-BE49-F238E27FC236}">
+                <a16:creationId xmlns:a16="http://schemas.microsoft.com/office/drawing/2014/main" id="{26DFAE41-0A9B-4AB9-BFD0-3A6F525144F4}"/>
+              </a:ext>
+            </a:extLst>
+          </p:cNvPr>
+          <p:cNvSpPr/>
+          <p:nvPr/>
+        </p:nvSpPr>
+        <p:spPr>
+          <a:xfrm>
+            <a:off x="1205644" y="5508188"/>
+            <a:ext cx="1906045" cy="1003440"/>
+          </a:xfrm>
+          <a:prstGeom prst="rect">
+            <a:avLst/>
+          </a:prstGeom>
+          <a:solidFill>
+            <a:schemeClr val="tx1">
+              <a:lumMod val="50000"/>
+              <a:lumOff val="50000"/>
+            </a:schemeClr>
+          </a:solidFill>
+        </p:spPr>
+        <p:style>
+          <a:lnRef idx="2">
+            <a:schemeClr val="accent1">
+              <a:shade val="50000"/>
+            </a:schemeClr>
+          </a:lnRef>
+          <a:fillRef idx="1">
+            <a:schemeClr val="accent1"/>
+          </a:fillRef>
+          <a:effectRef idx="0">
+            <a:schemeClr val="accent1"/>
+          </a:effectRef>
+          <a:fontRef idx="minor">
+            <a:schemeClr val="lt1"/>
+          </a:fontRef>
+        </p:style>
+        <p:txBody>
+          <a:bodyPr rtlCol="0" anchor="ctr"/>
+          <a:lstStyle/>
+          <a:p>
+            <a:pPr algn="ctr"/>
+            <a:endParaRPr lang="en-US"/>
+          </a:p>
+        </p:txBody>
+      </p:sp>
+      <p:sp>
+        <p:nvSpPr>
+          <p:cNvPr id="5" name="Rectangle 4"/>
+          <p:cNvSpPr/>
+          <p:nvPr/>
+        </p:nvSpPr>
+        <p:spPr>
+          <a:xfrm>
+            <a:off x="1205644" y="2465448"/>
+            <a:ext cx="9676660" cy="1090149"/>
+          </a:xfrm>
+          <a:prstGeom prst="rect">
+            <a:avLst/>
+          </a:prstGeom>
+          <a:solidFill>
+            <a:schemeClr val="accent3">
+              <a:alpha val="50000"/>
+            </a:schemeClr>
+          </a:solidFill>
+          <a:ln>
+            <a:noFill/>
+          </a:ln>
+        </p:spPr>
+        <p:style>
+          <a:lnRef idx="0">
+            <a:scrgbClr r="0" g="0" b="0"/>
+          </a:lnRef>
+          <a:fillRef idx="0">
+            <a:scrgbClr r="0" g="0" b="0"/>
+          </a:fillRef>
+          <a:effectRef idx="0">
+            <a:scrgbClr r="0" g="0" b="0"/>
+          </a:effectRef>
+          <a:fontRef idx="minor">
+            <a:schemeClr val="lt1"/>
+          </a:fontRef>
+        </p:style>
+        <p:txBody>
+          <a:bodyPr rtlCol="0" anchor="ctr"/>
+          <a:lstStyle/>
+          <a:p>
+            <a:pPr algn="ctr"/>
+            <a:r>
+              <a:rPr lang="en-US" sz="4800" b="1" dirty="0">
+                <a:solidFill>
+                  <a:schemeClr val="tx1"/>
+                </a:solidFill>
+                <a:latin typeface="Times New Roman" panose="02020603050405020304" pitchFamily="18" charset="0"/>
+                <a:cs typeface="Times New Roman" panose="02020603050405020304" pitchFamily="18" charset="0"/>
+              </a:rPr>
+              <a:t>RTE</a:t>
+            </a:r>
+          </a:p>
+        </p:txBody>
+      </p:sp>
+      <p:sp>
+        <p:nvSpPr>
+          <p:cNvPr id="4" name="Rectangle 3"/>
+          <p:cNvSpPr/>
+          <p:nvPr/>
+        </p:nvSpPr>
+        <p:spPr>
+          <a:xfrm>
+            <a:off x="1216241" y="522697"/>
+            <a:ext cx="9676660" cy="1828800"/>
+          </a:xfrm>
+          <a:prstGeom prst="rect">
+            <a:avLst/>
+          </a:prstGeom>
+          <a:solidFill>
+            <a:schemeClr val="accent1">
+              <a:alpha val="50000"/>
+            </a:schemeClr>
+          </a:solidFill>
+          <a:ln>
+            <a:noFill/>
+          </a:ln>
+        </p:spPr>
+        <p:style>
+          <a:lnRef idx="0">
+            <a:scrgbClr r="0" g="0" b="0"/>
+          </a:lnRef>
+          <a:fillRef idx="0">
+            <a:scrgbClr r="0" g="0" b="0"/>
+          </a:fillRef>
+          <a:effectRef idx="0">
+            <a:scrgbClr r="0" g="0" b="0"/>
+          </a:effectRef>
+          <a:fontRef idx="minor">
+            <a:schemeClr val="lt1"/>
+          </a:fontRef>
+        </p:style>
+        <p:txBody>
+          <a:bodyPr rtlCol="0" anchor="ctr"/>
+          <a:lstStyle/>
+          <a:p>
+            <a:pPr algn="ctr"/>
+            <a:endParaRPr lang="en-US"/>
+          </a:p>
+        </p:txBody>
+      </p:sp>
+      <p:sp>
+        <p:nvSpPr>
+          <p:cNvPr id="6" name="Rectangle 5"/>
+          <p:cNvSpPr/>
+          <p:nvPr/>
+        </p:nvSpPr>
+        <p:spPr>
+          <a:xfrm>
+            <a:off x="1205644" y="3698000"/>
+            <a:ext cx="9682668" cy="1810188"/>
+          </a:xfrm>
+          <a:prstGeom prst="rect">
+            <a:avLst/>
+          </a:prstGeom>
+          <a:solidFill>
+            <a:schemeClr val="dk1">
+              <a:alpha val="50000"/>
+            </a:schemeClr>
+          </a:solidFill>
+          <a:ln>
+            <a:noFill/>
+          </a:ln>
+        </p:spPr>
+        <p:style>
+          <a:lnRef idx="0">
+            <a:scrgbClr r="0" g="0" b="0"/>
+          </a:lnRef>
+          <a:fillRef idx="0">
+            <a:scrgbClr r="0" g="0" b="0"/>
+          </a:fillRef>
+          <a:effectRef idx="0">
+            <a:scrgbClr r="0" g="0" b="0"/>
+          </a:effectRef>
+          <a:fontRef idx="minor">
+            <a:schemeClr val="lt1"/>
+          </a:fontRef>
+        </p:style>
+        <p:txBody>
+          <a:bodyPr rtlCol="0" anchor="ctr"/>
+          <a:lstStyle/>
+          <a:p>
+            <a:pPr algn="ctr"/>
+            <a:endParaRPr lang="en-US" dirty="0"/>
+          </a:p>
+        </p:txBody>
+      </p:sp>
+      <p:sp>
+        <p:nvSpPr>
+          <p:cNvPr id="7" name="Rectangle 6">
+            <a:extLst>
+              <a:ext uri="{FF2B5EF4-FFF2-40B4-BE49-F238E27FC236}">
+                <a16:creationId xmlns:a16="http://schemas.microsoft.com/office/drawing/2014/main" id="{4DED3980-4495-4631-9138-16CE3A553AFE}"/>
+              </a:ext>
+            </a:extLst>
+          </p:cNvPr>
+          <p:cNvSpPr/>
+          <p:nvPr/>
+        </p:nvSpPr>
+        <p:spPr>
+          <a:xfrm>
+            <a:off x="3295672" y="5610500"/>
+            <a:ext cx="7520348" cy="840413"/>
+          </a:xfrm>
+          <a:prstGeom prst="rect">
+            <a:avLst/>
+          </a:prstGeom>
+          <a:solidFill>
+            <a:srgbClr val="E98751"/>
+          </a:solidFill>
+        </p:spPr>
+        <p:style>
+          <a:lnRef idx="2">
+            <a:schemeClr val="accent1">
+              <a:shade val="50000"/>
+            </a:schemeClr>
+          </a:lnRef>
+          <a:fillRef idx="1">
+            <a:schemeClr val="accent1"/>
+          </a:fillRef>
+          <a:effectRef idx="0">
+            <a:schemeClr val="accent1"/>
+          </a:effectRef>
+          <a:fontRef idx="minor">
+            <a:schemeClr val="lt1"/>
+          </a:fontRef>
+        </p:style>
+        <p:txBody>
+          <a:bodyPr rtlCol="0" anchor="ctr"/>
+          <a:lstStyle/>
+          <a:p>
+            <a:pPr algn="ctr"/>
+            <a:endParaRPr lang="en-US"/>
+          </a:p>
+        </p:txBody>
+      </p:sp>
       <p:grpSp>
         <p:nvGrpSpPr>
           <p:cNvPr id="59" name="Group 58">
@@ -3680,153 +3980,6 @@
       </p:grpSp>
       <p:sp>
         <p:nvSpPr>
-          <p:cNvPr id="4" name="Rectangle 3"/>
-          <p:cNvSpPr/>
-          <p:nvPr/>
-        </p:nvSpPr>
-        <p:spPr>
-          <a:xfrm>
-            <a:off x="1216241" y="522697"/>
-            <a:ext cx="9676660" cy="1828800"/>
-          </a:xfrm>
-          <a:prstGeom prst="rect">
-            <a:avLst/>
-          </a:prstGeom>
-          <a:solidFill>
-            <a:schemeClr val="accent1">
-              <a:alpha val="50000"/>
-            </a:schemeClr>
-          </a:solidFill>
-          <a:ln>
-            <a:noFill/>
-          </a:ln>
-        </p:spPr>
-        <p:style>
-          <a:lnRef idx="0">
-            <a:scrgbClr r="0" g="0" b="0"/>
-          </a:lnRef>
-          <a:fillRef idx="0">
-            <a:scrgbClr r="0" g="0" b="0"/>
-          </a:fillRef>
-          <a:effectRef idx="0">
-            <a:scrgbClr r="0" g="0" b="0"/>
-          </a:effectRef>
-          <a:fontRef idx="minor">
-            <a:schemeClr val="lt1"/>
-          </a:fontRef>
-        </p:style>
-        <p:txBody>
-          <a:bodyPr rtlCol="0" anchor="ctr"/>
-          <a:lstStyle/>
-          <a:p>
-            <a:pPr algn="ctr"/>
-            <a:endParaRPr lang="en-US"/>
-          </a:p>
-        </p:txBody>
-      </p:sp>
-      <p:sp>
-        <p:nvSpPr>
-          <p:cNvPr id="5" name="Rectangle 4"/>
-          <p:cNvSpPr/>
-          <p:nvPr/>
-        </p:nvSpPr>
-        <p:spPr>
-          <a:xfrm>
-            <a:off x="1205644" y="2465448"/>
-            <a:ext cx="9676660" cy="1090149"/>
-          </a:xfrm>
-          <a:prstGeom prst="rect">
-            <a:avLst/>
-          </a:prstGeom>
-          <a:solidFill>
-            <a:schemeClr val="accent3">
-              <a:alpha val="50000"/>
-            </a:schemeClr>
-          </a:solidFill>
-          <a:ln>
-            <a:noFill/>
-          </a:ln>
-        </p:spPr>
-        <p:style>
-          <a:lnRef idx="0">
-            <a:scrgbClr r="0" g="0" b="0"/>
-          </a:lnRef>
-          <a:fillRef idx="0">
-            <a:scrgbClr r="0" g="0" b="0"/>
-          </a:fillRef>
-          <a:effectRef idx="0">
-            <a:scrgbClr r="0" g="0" b="0"/>
-          </a:effectRef>
-          <a:fontRef idx="minor">
-            <a:schemeClr val="lt1"/>
-          </a:fontRef>
-        </p:style>
-        <p:txBody>
-          <a:bodyPr rtlCol="0" anchor="ctr"/>
-          <a:lstStyle/>
-          <a:p>
-            <a:pPr algn="ctr"/>
-            <a:r>
-              <a:rPr lang="en-US" sz="4800" b="1" dirty="0">
-                <a:solidFill>
-                  <a:schemeClr val="tx1"/>
-                </a:solidFill>
-                <a:latin typeface="Times New Roman" panose="02020603050405020304" pitchFamily="18" charset="0"/>
-                <a:cs typeface="Times New Roman" panose="02020603050405020304" pitchFamily="18" charset="0"/>
-              </a:rPr>
-              <a:t>RTE</a:t>
-            </a:r>
-          </a:p>
-        </p:txBody>
-      </p:sp>
-      <p:sp>
-        <p:nvSpPr>
-          <p:cNvPr id="6" name="Rectangle 5"/>
-          <p:cNvSpPr/>
-          <p:nvPr/>
-        </p:nvSpPr>
-        <p:spPr>
-          <a:xfrm>
-            <a:off x="1205644" y="3697999"/>
-            <a:ext cx="9682668" cy="2813629"/>
-          </a:xfrm>
-          <a:prstGeom prst="rect">
-            <a:avLst/>
-          </a:prstGeom>
-          <a:solidFill>
-            <a:schemeClr val="dk1">
-              <a:alpha val="50000"/>
-            </a:schemeClr>
-          </a:solidFill>
-          <a:ln>
-            <a:noFill/>
-          </a:ln>
-        </p:spPr>
-        <p:style>
-          <a:lnRef idx="0">
-            <a:scrgbClr r="0" g="0" b="0"/>
-          </a:lnRef>
-          <a:fillRef idx="0">
-            <a:scrgbClr r="0" g="0" b="0"/>
-          </a:fillRef>
-          <a:effectRef idx="0">
-            <a:scrgbClr r="0" g="0" b="0"/>
-          </a:effectRef>
-          <a:fontRef idx="minor">
-            <a:schemeClr val="lt1"/>
-          </a:fontRef>
-        </p:style>
-        <p:txBody>
-          <a:bodyPr rtlCol="0" anchor="ctr"/>
-          <a:lstStyle/>
-          <a:p>
-            <a:pPr algn="ctr"/>
-            <a:endParaRPr lang="en-US"/>
-          </a:p>
-        </p:txBody>
-      </p:sp>
-      <p:sp>
-        <p:nvSpPr>
           <p:cNvPr id="13" name="Rounded Rectangle 12"/>
           <p:cNvSpPr/>
           <p:nvPr/>
@@ -4300,58 +4453,6 @@
       </p:grpSp>
       <p:sp>
         <p:nvSpPr>
-          <p:cNvPr id="88" name="Rectangle 87">
-            <a:extLst>
-              <a:ext uri="{FF2B5EF4-FFF2-40B4-BE49-F238E27FC236}">
-                <a16:creationId xmlns:a16="http://schemas.microsoft.com/office/drawing/2014/main" id="{6572BA62-1602-43D0-BAFB-FB8D3C928E50}"/>
-              </a:ext>
-            </a:extLst>
-          </p:cNvPr>
-          <p:cNvSpPr/>
-          <p:nvPr/>
-        </p:nvSpPr>
-        <p:spPr>
-          <a:xfrm>
-            <a:off x="1216241" y="502928"/>
-            <a:ext cx="9676660" cy="1828800"/>
-          </a:xfrm>
-          <a:prstGeom prst="rect">
-            <a:avLst/>
-          </a:prstGeom>
-          <a:solidFill>
-            <a:schemeClr val="accent1">
-              <a:alpha val="50000"/>
-            </a:schemeClr>
-          </a:solidFill>
-          <a:ln>
-            <a:noFill/>
-          </a:ln>
-        </p:spPr>
-        <p:style>
-          <a:lnRef idx="0">
-            <a:scrgbClr r="0" g="0" b="0"/>
-          </a:lnRef>
-          <a:fillRef idx="0">
-            <a:scrgbClr r="0" g="0" b="0"/>
-          </a:fillRef>
-          <a:effectRef idx="0">
-            <a:scrgbClr r="0" g="0" b="0"/>
-          </a:effectRef>
-          <a:fontRef idx="minor">
-            <a:schemeClr val="lt1"/>
-          </a:fontRef>
-        </p:style>
-        <p:txBody>
-          <a:bodyPr rtlCol="0" anchor="ctr"/>
-          <a:lstStyle/>
-          <a:p>
-            <a:pPr algn="ctr"/>
-            <a:endParaRPr lang="en-US" dirty="0"/>
-          </a:p>
-        </p:txBody>
-      </p:sp>
-      <p:sp>
-        <p:nvSpPr>
           <p:cNvPr id="102" name="Rounded Rectangle 12">
             <a:extLst>
               <a:ext uri="{FF2B5EF4-FFF2-40B4-BE49-F238E27FC236}">
@@ -4464,8 +4565,8 @@
         </p:nvSpPr>
         <p:spPr>
           <a:xfrm>
-            <a:off x="1389627" y="4876488"/>
-            <a:ext cx="750455" cy="1551149"/>
+            <a:off x="1389627" y="3807138"/>
+            <a:ext cx="1570930" cy="2620500"/>
           </a:xfrm>
           <a:prstGeom prst="roundRect">
             <a:avLst/>
@@ -4514,8 +4615,8 @@
         </p:nvSpPr>
         <p:spPr>
           <a:xfrm>
-            <a:off x="2322180" y="5738641"/>
-            <a:ext cx="950845" cy="625433"/>
+            <a:off x="1604750" y="5610500"/>
+            <a:ext cx="1165746" cy="625433"/>
           </a:xfrm>
           <a:prstGeom prst="roundRect">
             <a:avLst/>
@@ -5829,9 +5930,9 @@
               <p:nvPr/>
             </p:nvSpPr>
             <p:spPr>
-              <a:xfrm rot="16200000">
-                <a:off x="10542323" y="3031794"/>
-                <a:ext cx="141251" cy="180211"/>
+              <a:xfrm rot="16200000" flipV="1">
+                <a:off x="10403737" y="3010556"/>
+                <a:ext cx="141249" cy="222684"/>
               </a:xfrm>
               <a:prstGeom prst="triangle">
                 <a:avLst/>
@@ -5955,7 +6056,7 @@
               </a:lstStyle>
               <a:p>
                 <a:pPr algn="ctr"/>
-                <a:endParaRPr lang="en-US"/>
+                <a:endParaRPr lang="en-US" dirty="0"/>
               </a:p>
             </p:txBody>
           </p:sp>
@@ -6099,7 +6200,7 @@
             </a:lstStyle>
             <a:p>
               <a:pPr algn="ctr"/>
-              <a:endParaRPr lang="en-US"/>
+              <a:endParaRPr lang="en-US" dirty="0"/>
             </a:p>
           </p:txBody>
         </p:sp>

</xml_diff>